<commit_message>
Day 40 Content updated
</commit_message>
<xml_diff>
--- a/Day40/DockerAndKubernetes_Training-Day40.pptx
+++ b/Day40/DockerAndKubernetes_Training-Day40.pptx
@@ -199,7 +199,7 @@
           <a:p>
             <a:fld id="{B09F413D-6E72-4B8A-80ED-A580F7C91B71}" type="datetimeFigureOut">
               <a:rPr lang="en-IN" smtClean="0"/>
-              <a:t>23-05-2023</a:t>
+              <a:t>25-05-2023</a:t>
             </a:fld>
             <a:endParaRPr lang="en-IN"/>
           </a:p>
@@ -802,7 +802,7 @@
           <a:p>
             <a:fld id="{12E8600E-B0EE-4521-BF40-4B72FBA06775}" type="datetimeFigureOut">
               <a:rPr lang="en-IN" smtClean="0"/>
-              <a:t>23-05-2023</a:t>
+              <a:t>25-05-2023</a:t>
             </a:fld>
             <a:endParaRPr lang="en-IN"/>
           </a:p>
@@ -1891,7 +1891,7 @@
             <a:fld id="{49F3E739-D457-46E5-B626-C9B182A007EE}" type="datetimeFigureOut">
               <a:rPr lang="en-US" smtClean="0"/>
               <a:pPr/>
-              <a:t>5/23/2023</a:t>
+              <a:t>5/25/2023</a:t>
             </a:fld>
             <a:endParaRPr lang="en-US"/>
           </a:p>
@@ -2873,7 +2873,7 @@
             <a:fld id="{49F3E739-D457-46E5-B626-C9B182A007EE}" type="datetimeFigureOut">
               <a:rPr lang="en-US" smtClean="0"/>
               <a:pPr/>
-              <a:t>5/23/2023</a:t>
+              <a:t>5/25/2023</a:t>
             </a:fld>
             <a:endParaRPr lang="en-US"/>
           </a:p>
@@ -4009,7 +4009,7 @@
             <a:fld id="{49F3E739-D457-46E5-B626-C9B182A007EE}" type="datetimeFigureOut">
               <a:rPr lang="en-US" smtClean="0"/>
               <a:pPr/>
-              <a:t>5/23/2023</a:t>
+              <a:t>5/25/2023</a:t>
             </a:fld>
             <a:endParaRPr lang="en-US"/>
           </a:p>
@@ -5044,7 +5044,7 @@
             <a:fld id="{49F3E739-D457-46E5-B626-C9B182A007EE}" type="datetimeFigureOut">
               <a:rPr lang="en-US" smtClean="0"/>
               <a:pPr/>
-              <a:t>5/23/2023</a:t>
+              <a:t>5/25/2023</a:t>
             </a:fld>
             <a:endParaRPr lang="en-US"/>
           </a:p>
@@ -5706,7 +5706,7 @@
             <a:fld id="{49F3E739-D457-46E5-B626-C9B182A007EE}" type="datetimeFigureOut">
               <a:rPr lang="en-US" smtClean="0"/>
               <a:pPr/>
-              <a:t>5/23/2023</a:t>
+              <a:t>5/25/2023</a:t>
             </a:fld>
             <a:endParaRPr lang="en-US"/>
           </a:p>
@@ -6569,7 +6569,7 @@
             <a:fld id="{49F3E739-D457-46E5-B626-C9B182A007EE}" type="datetimeFigureOut">
               <a:rPr lang="en-US" smtClean="0"/>
               <a:pPr/>
-              <a:t>5/23/2023</a:t>
+              <a:t>5/25/2023</a:t>
             </a:fld>
             <a:endParaRPr lang="en-US"/>
           </a:p>
@@ -6760,7 +6760,7 @@
           <a:p>
             <a:fld id="{12E8600E-B0EE-4521-BF40-4B72FBA06775}" type="datetimeFigureOut">
               <a:rPr lang="en-IN" smtClean="0"/>
-              <a:t>23-05-2023</a:t>
+              <a:t>25-05-2023</a:t>
             </a:fld>
             <a:endParaRPr lang="en-IN"/>
           </a:p>
@@ -7732,7 +7732,7 @@
           <a:p>
             <a:fld id="{12E8600E-B0EE-4521-BF40-4B72FBA06775}" type="datetimeFigureOut">
               <a:rPr lang="en-IN" smtClean="0"/>
-              <a:t>23-05-2023</a:t>
+              <a:t>25-05-2023</a:t>
             </a:fld>
             <a:endParaRPr lang="en-IN"/>
           </a:p>
@@ -7943,7 +7943,7 @@
           <a:p>
             <a:fld id="{12E8600E-B0EE-4521-BF40-4B72FBA06775}" type="datetimeFigureOut">
               <a:rPr lang="en-IN" smtClean="0"/>
-              <a:t>23-05-2023</a:t>
+              <a:t>25-05-2023</a:t>
             </a:fld>
             <a:endParaRPr lang="en-IN"/>
           </a:p>
@@ -8977,7 +8977,7 @@
           <a:p>
             <a:fld id="{12E8600E-B0EE-4521-BF40-4B72FBA06775}" type="datetimeFigureOut">
               <a:rPr lang="en-IN" smtClean="0"/>
-              <a:t>23-05-2023</a:t>
+              <a:t>25-05-2023</a:t>
             </a:fld>
             <a:endParaRPr lang="en-IN"/>
           </a:p>
@@ -9249,7 +9249,7 @@
           <a:p>
             <a:fld id="{12E8600E-B0EE-4521-BF40-4B72FBA06775}" type="datetimeFigureOut">
               <a:rPr lang="en-IN" smtClean="0"/>
-              <a:t>23-05-2023</a:t>
+              <a:t>25-05-2023</a:t>
             </a:fld>
             <a:endParaRPr lang="en-IN"/>
           </a:p>
@@ -9660,7 +9660,7 @@
             <a:fld id="{49F3E739-D457-46E5-B626-C9B182A007EE}" type="datetimeFigureOut">
               <a:rPr lang="en-US" smtClean="0"/>
               <a:pPr/>
-              <a:t>5/23/2023</a:t>
+              <a:t>5/25/2023</a:t>
             </a:fld>
             <a:endParaRPr lang="en-US"/>
           </a:p>
@@ -9788,7 +9788,7 @@
           <a:p>
             <a:fld id="{12E8600E-B0EE-4521-BF40-4B72FBA06775}" type="datetimeFigureOut">
               <a:rPr lang="en-IN" smtClean="0"/>
-              <a:t>23-05-2023</a:t>
+              <a:t>25-05-2023</a:t>
             </a:fld>
             <a:endParaRPr lang="en-IN"/>
           </a:p>
@@ -9883,7 +9883,7 @@
           <a:p>
             <a:fld id="{12E8600E-B0EE-4521-BF40-4B72FBA06775}" type="datetimeFigureOut">
               <a:rPr lang="en-IN" smtClean="0"/>
-              <a:t>23-05-2023</a:t>
+              <a:t>25-05-2023</a:t>
             </a:fld>
             <a:endParaRPr lang="en-IN"/>
           </a:p>
@@ -10964,7 +10964,7 @@
           <a:p>
             <a:fld id="{12E8600E-B0EE-4521-BF40-4B72FBA06775}" type="datetimeFigureOut">
               <a:rPr lang="en-IN" smtClean="0"/>
-              <a:t>23-05-2023</a:t>
+              <a:t>25-05-2023</a:t>
             </a:fld>
             <a:endParaRPr lang="en-IN"/>
           </a:p>
@@ -12073,7 +12073,7 @@
             <a:fld id="{49F3E739-D457-46E5-B626-C9B182A007EE}" type="datetimeFigureOut">
               <a:rPr lang="en-US" smtClean="0"/>
               <a:pPr/>
-              <a:t>5/23/2023</a:t>
+              <a:t>5/25/2023</a:t>
             </a:fld>
             <a:endParaRPr lang="en-US"/>
           </a:p>
@@ -13072,7 +13072,7 @@
             <a:fld id="{49F3E739-D457-46E5-B626-C9B182A007EE}" type="datetimeFigureOut">
               <a:rPr lang="en-US" smtClean="0"/>
               <a:pPr/>
-              <a:t>5/23/2023</a:t>
+              <a:t>5/25/2023</a:t>
             </a:fld>
             <a:endParaRPr lang="en-US"/>
           </a:p>
@@ -13799,7 +13799,7 @@
         </p:spPr>
         <p:txBody>
           <a:bodyPr vert="horz" lIns="91440" tIns="45720" rIns="91440" bIns="45720" rtlCol="0">
-            <a:normAutofit fontScale="92500" lnSpcReduction="20000"/>
+            <a:normAutofit fontScale="92500" lnSpcReduction="10000"/>
           </a:bodyPr>
           <a:lstStyle>
             <a:lvl1pPr marL="342900" indent="-342900" algn="l" defTabSz="457200" rtl="0" eaLnBrk="1" latinLnBrk="0" hangingPunct="1">
@@ -14037,89 +14037,84 @@
           <a:p>
             <a:r>
               <a:rPr lang="en-US" dirty="0"/>
-              <a:t>Problem faced with </a:t>
+              <a:t>Git - Architecture and advantage - 10 minutes</a:t>
+            </a:r>
+          </a:p>
+          <a:p>
+            <a:r>
+              <a:rPr lang="en-US" dirty="0"/>
+              <a:t>Git - Command reference - 5 minutes</a:t>
+            </a:r>
+          </a:p>
+          <a:p>
+            <a:r>
+              <a:rPr lang="en-US" dirty="0" err="1"/>
+              <a:t>DevSecOps</a:t>
+            </a:r>
+            <a:r>
+              <a:rPr lang="en-US" dirty="0"/>
+              <a:t> in Kubernetes way - 30 minutes</a:t>
+            </a:r>
+          </a:p>
+          <a:p>
+            <a:r>
+              <a:rPr lang="en-US" dirty="0"/>
+              <a:t>Container </a:t>
             </a:r>
             <a:r>
               <a:rPr lang="en-US" dirty="0" err="1"/>
-              <a:t>KubeAdm</a:t>
+              <a:t>Scaning</a:t>
             </a:r>
             <a:r>
               <a:rPr lang="en-US" dirty="0"/>
-              <a:t> setup during </a:t>
+              <a:t> Options - 5 minutes</a:t>
+            </a:r>
+          </a:p>
+          <a:p>
+            <a:r>
+              <a:rPr lang="en-US" dirty="0"/>
+              <a:t>DevOps - Architecture reference (Microservice) in K8s way - 15 Minutes</a:t>
+            </a:r>
+          </a:p>
+          <a:p>
+            <a:r>
+              <a:rPr lang="en-US" dirty="0" err="1"/>
+              <a:t>GitOps</a:t>
+            </a:r>
+            <a:r>
+              <a:rPr lang="en-US" dirty="0"/>
+              <a:t> - Architecture Diagram Reference - 20 Minutes</a:t>
+            </a:r>
+          </a:p>
+          <a:p>
+            <a:r>
+              <a:rPr lang="en-US" dirty="0" err="1"/>
+              <a:t>ArgoCD</a:t>
+            </a:r>
+            <a:r>
+              <a:rPr lang="en-US" dirty="0"/>
+              <a:t> - Understanding - 15 Minutes</a:t>
+            </a:r>
+          </a:p>
+          <a:p>
+            <a:r>
+              <a:rPr lang="en-US" dirty="0"/>
+              <a:t>Kubernetes Dashboard via </a:t>
             </a:r>
             <a:r>
               <a:rPr lang="en-US" dirty="0" err="1"/>
-              <a:t>externalIP</a:t>
+              <a:t>Killercoda</a:t>
+            </a:r>
+            <a:endParaRPr lang="en-US" dirty="0"/>
+          </a:p>
+          <a:p>
+            <a:r>
+              <a:rPr lang="en-US" dirty="0" err="1"/>
+              <a:t>ServiceMesh</a:t>
             </a:r>
             <a:r>
               <a:rPr lang="en-US" dirty="0"/>
-              <a:t> assignment for Services - LB</a:t>
-            </a:r>
-          </a:p>
-          <a:p>
-            <a:r>
-              <a:rPr lang="en-US" dirty="0" err="1"/>
-              <a:t>Metallb</a:t>
-            </a:r>
-            <a:r>
-              <a:rPr lang="en-US" dirty="0"/>
-              <a:t> based load balancer configuration - Bare Metal Kubernetes </a:t>
-            </a:r>
-          </a:p>
-          <a:p>
-            <a:r>
-              <a:rPr lang="en-US" dirty="0"/>
-              <a:t>GKE - GCP Managed Cluster creation - 3 nodes</a:t>
-            </a:r>
-          </a:p>
-          <a:p>
-            <a:r>
-              <a:rPr lang="en-US" dirty="0"/>
-              <a:t>Cheapest option for GKE cluster creation/Free Tier reference</a:t>
-            </a:r>
-          </a:p>
-          <a:p>
-            <a:r>
-              <a:rPr lang="en-US" dirty="0"/>
-              <a:t>Ingress understanding in detail</a:t>
-            </a:r>
-          </a:p>
-          <a:p>
-            <a:r>
-              <a:rPr lang="en-US" dirty="0"/>
-              <a:t>Network policy understanding and fitment with ingress and Egress</a:t>
-            </a:r>
-          </a:p>
-          <a:p>
-            <a:r>
-              <a:rPr lang="en-US" dirty="0"/>
-              <a:t>Ingress implementation in real world, examples</a:t>
-            </a:r>
-          </a:p>
-          <a:p>
-            <a:r>
-              <a:rPr lang="en-US" dirty="0"/>
-              <a:t>Service and Ingress based implementation - Demo</a:t>
-            </a:r>
-          </a:p>
-          <a:p>
-            <a:r>
-              <a:rPr lang="en-US" dirty="0"/>
-              <a:t>Ingress controller setup - Nginx-ingress controller</a:t>
-            </a:r>
-          </a:p>
-          <a:p>
-            <a:r>
-              <a:rPr lang="en-US" dirty="0"/>
-              <a:t>DNS readiness for ingress based setups/Free tier (</a:t>
-            </a:r>
-            <a:r>
-              <a:rPr lang="en-US" dirty="0" err="1"/>
-              <a:t>DuckDNS</a:t>
-            </a:r>
-            <a:r>
-              <a:rPr lang="en-US" dirty="0"/>
-              <a:t>)</a:t>
+              <a:t> - Reference architecture and usage, links to share - 15 Minutes</a:t>
             </a:r>
             <a:endParaRPr lang="en-IN" dirty="0"/>
           </a:p>
@@ -14214,8 +14209,13 @@
           <a:p>
             <a:r>
               <a:rPr lang="en-US" dirty="0"/>
-              <a:t>Refer training notes section for links</a:t>
+              <a:t>Refer training notes section for links </a:t>
             </a:r>
+            <a:r>
+              <a:rPr lang="en-US"/>
+              <a:t>on topics</a:t>
+            </a:r>
+            <a:endParaRPr lang="en-US" dirty="0"/>
           </a:p>
         </p:txBody>
       </p:sp>

</xml_diff>